<commit_message>
Add session two additional notes
</commit_message>
<xml_diff>
--- a/session_two/session_two_presentation.pptx
+++ b/session_two/session_two_presentation.pptx
@@ -790,7 +790,7 @@
             <a:fld id="{3BBED7E8-0829-F34C-B479-A757805E6C1B}" type="datetimeFigureOut">
               <a:rPr lang="en-US" smtClean="0"/>
               <a:pPr/>
-              <a:t>7/13/2020</a:t>
+              <a:t>7/19/2020</a:t>
             </a:fld>
             <a:endParaRPr lang="en-US"/>
           </a:p>
@@ -958,7 +958,7 @@
             <a:fld id="{6C7E4F11-7667-5045-A00B-01970EA44BB5}" type="datetimeFigureOut">
               <a:rPr lang="en-US" smtClean="0"/>
               <a:pPr/>
-              <a:t>7/13/2020</a:t>
+              <a:t>7/19/2020</a:t>
             </a:fld>
             <a:endParaRPr lang="en-US"/>
           </a:p>
@@ -35926,6 +35926,11 @@
 
 <file path=customXml/item1.xml><?xml version="1.0" encoding="utf-8"?>
 <?mso-contentType ?>
+<SharedContentType xmlns="Microsoft.SharePoint.Taxonomy.ContentTypeSync" SourceId="1ee89e71-04cd-405e-9ca3-99e020c1694d" ContentTypeId="0x0101" PreviousValue="false"/>
+</file>
+
+<file path=customXml/item2.xml><?xml version="1.0" encoding="utf-8"?>
+<?mso-contentType ?>
 <FormTemplates xmlns="http://schemas.microsoft.com/sharepoint/v3/contenttype/forms">
   <Display>DocumentLibraryForm</Display>
   <Edit>DocumentLibraryForm</Edit>
@@ -35933,12 +35938,16 @@
 </FormTemplates>
 </file>
 
-<file path=customXml/item2.xml><?xml version="1.0" encoding="utf-8"?>
-<?mso-contentType ?>
-<SharedContentType xmlns="Microsoft.SharePoint.Taxonomy.ContentTypeSync" SourceId="1ee89e71-04cd-405e-9ca3-99e020c1694d" ContentTypeId="0x0101" PreviousValue="false"/>
+<file path=customXml/item3.xml><?xml version="1.0" encoding="utf-8"?>
+<p:properties xmlns:p="http://schemas.microsoft.com/office/2006/metadata/properties" xmlns:xsi="http://www.w3.org/2001/XMLSchema-instance" xmlns:pc="http://schemas.microsoft.com/office/infopath/2007/PartnerControls">
+  <documentManagement>
+    <Keyword xmlns="44a56295-c29e-4898-8136-a54736c65b82" xsi:nil="true"/>
+    <Descriptions xmlns="44a56295-c29e-4898-8136-a54736c65b82" xsi:nil="true"/>
+  </documentManagement>
+</p:properties>
 </file>
 
-<file path=customXml/item3.xml><?xml version="1.0" encoding="utf-8"?>
+<file path=customXml/item4.xml><?xml version="1.0" encoding="utf-8"?>
 <ct:contentTypeSchema xmlns:ct="http://schemas.microsoft.com/office/2006/metadata/contentType" xmlns:ma="http://schemas.microsoft.com/office/2006/metadata/properties/metaAttributes" ct:_="" ma:_="" ma:contentTypeName="Document" ma:contentTypeID="0x010100C9F3DD611966374C9EAA8DC5A2F94CD8" ma:contentTypeVersion="8" ma:contentTypeDescription="Create a new document." ma:contentTypeScope="" ma:versionID="18a8759320524e51783f13c6663a10d1">
   <xsd:schema xmlns:xsd="http://www.w3.org/2001/XMLSchema" xmlns:xs="http://www.w3.org/2001/XMLSchema" xmlns:p="http://schemas.microsoft.com/office/2006/metadata/properties" xmlns:ns2="44a56295-c29e-4898-8136-a54736c65b82" xmlns:ns3="9675ef8f-b755-4cd6-a742-8cae3d86c4fe" targetNamespace="http://schemas.microsoft.com/office/2006/metadata/properties" ma:root="true" ma:fieldsID="1b693415669a5bc10d56a9234ce5202b" ns2:_="" ns3:_="">
     <xsd:import namespace="44a56295-c29e-4898-8136-a54736c65b82"/>
@@ -36117,16 +36126,15 @@
 </ct:contentTypeSchema>
 </file>
 
-<file path=customXml/item4.xml><?xml version="1.0" encoding="utf-8"?>
-<p:properties xmlns:p="http://schemas.microsoft.com/office/2006/metadata/properties" xmlns:xsi="http://www.w3.org/2001/XMLSchema-instance" xmlns:pc="http://schemas.microsoft.com/office/infopath/2007/PartnerControls">
-  <documentManagement>
-    <Keyword xmlns="44a56295-c29e-4898-8136-a54736c65b82" xsi:nil="true"/>
-    <Descriptions xmlns="44a56295-c29e-4898-8136-a54736c65b82" xsi:nil="true"/>
-  </documentManagement>
-</p:properties>
+<file path=customXml/itemProps1.xml><?xml version="1.0" encoding="utf-8"?>
+<ds:datastoreItem xmlns:ds="http://schemas.openxmlformats.org/officeDocument/2006/customXml" ds:itemID="{3D9D9437-4660-4E6E-9349-9C8386915BD1}">
+  <ds:schemaRefs>
+    <ds:schemaRef ds:uri="Microsoft.SharePoint.Taxonomy.ContentTypeSync"/>
+  </ds:schemaRefs>
+</ds:datastoreItem>
 </file>
 
-<file path=customXml/itemProps1.xml><?xml version="1.0" encoding="utf-8"?>
+<file path=customXml/itemProps2.xml><?xml version="1.0" encoding="utf-8"?>
 <ds:datastoreItem xmlns:ds="http://schemas.openxmlformats.org/officeDocument/2006/customXml" ds:itemID="{CCB085B9-8EF5-4B2C-B089-029492EC23AC}">
   <ds:schemaRefs>
     <ds:schemaRef ds:uri="http://schemas.microsoft.com/sharepoint/v3/contenttype/forms"/>
@@ -36134,15 +36142,24 @@
 </ds:datastoreItem>
 </file>
 
-<file path=customXml/itemProps2.xml><?xml version="1.0" encoding="utf-8"?>
-<ds:datastoreItem xmlns:ds="http://schemas.openxmlformats.org/officeDocument/2006/customXml" ds:itemID="{3D9D9437-4660-4E6E-9349-9C8386915BD1}">
+<file path=customXml/itemProps3.xml><?xml version="1.0" encoding="utf-8"?>
+<ds:datastoreItem xmlns:ds="http://schemas.openxmlformats.org/officeDocument/2006/customXml" ds:itemID="{8E7055A9-979E-42E4-8AE4-11D4A57371C1}">
   <ds:schemaRefs>
-    <ds:schemaRef ds:uri="Microsoft.SharePoint.Taxonomy.ContentTypeSync"/>
+    <ds:schemaRef ds:uri="http://purl.org/dc/terms/"/>
+    <ds:schemaRef ds:uri="9675ef8f-b755-4cd6-a742-8cae3d86c4fe"/>
+    <ds:schemaRef ds:uri="http://schemas.microsoft.com/office/2006/documentManagement/types"/>
+    <ds:schemaRef ds:uri="http://schemas.openxmlformats.org/package/2006/metadata/core-properties"/>
+    <ds:schemaRef ds:uri="http://purl.org/dc/elements/1.1/"/>
+    <ds:schemaRef ds:uri="http://schemas.microsoft.com/office/2006/metadata/properties"/>
+    <ds:schemaRef ds:uri="44a56295-c29e-4898-8136-a54736c65b82"/>
+    <ds:schemaRef ds:uri="http://schemas.microsoft.com/office/infopath/2007/PartnerControls"/>
+    <ds:schemaRef ds:uri="http://www.w3.org/XML/1998/namespace"/>
+    <ds:schemaRef ds:uri="http://purl.org/dc/dcmitype/"/>
   </ds:schemaRefs>
 </ds:datastoreItem>
 </file>
 
-<file path=customXml/itemProps3.xml><?xml version="1.0" encoding="utf-8"?>
+<file path=customXml/itemProps4.xml><?xml version="1.0" encoding="utf-8"?>
 <ds:datastoreItem xmlns:ds="http://schemas.openxmlformats.org/officeDocument/2006/customXml" ds:itemID="{0B5CDA7F-D407-42B2-AFFC-685DACC4A847}">
   <ds:schemaRefs>
     <ds:schemaRef ds:uri="http://schemas.microsoft.com/office/2006/metadata/contentType"/>
@@ -36159,21 +36176,4 @@
     <ds:schemaRef ds:uri="http://schemas.microsoft.com/internal/obd"/>
   </ds:schemaRefs>
 </ds:datastoreItem>
-</file>
-
-<file path=customXml/itemProps4.xml><?xml version="1.0" encoding="utf-8"?>
-<ds:datastoreItem xmlns:ds="http://schemas.openxmlformats.org/officeDocument/2006/customXml" ds:itemID="{8E7055A9-979E-42E4-8AE4-11D4A57371C1}">
-  <ds:schemaRefs>
-    <ds:schemaRef ds:uri="http://purl.org/dc/terms/"/>
-    <ds:schemaRef ds:uri="9675ef8f-b755-4cd6-a742-8cae3d86c4fe"/>
-    <ds:schemaRef ds:uri="http://schemas.microsoft.com/office/2006/documentManagement/types"/>
-    <ds:schemaRef ds:uri="http://schemas.openxmlformats.org/package/2006/metadata/core-properties"/>
-    <ds:schemaRef ds:uri="http://purl.org/dc/elements/1.1/"/>
-    <ds:schemaRef ds:uri="http://schemas.microsoft.com/office/2006/metadata/properties"/>
-    <ds:schemaRef ds:uri="44a56295-c29e-4898-8136-a54736c65b82"/>
-    <ds:schemaRef ds:uri="http://schemas.microsoft.com/office/infopath/2007/PartnerControls"/>
-    <ds:schemaRef ds:uri="http://www.w3.org/XML/1998/namespace"/>
-    <ds:schemaRef ds:uri="http://purl.org/dc/dcmitype/"/>
-  </ds:schemaRefs>
-</ds:datastoreItem>
 </file>
</xml_diff>